<commit_message>
cập nhật phần đề cương đề tài và kiến trúc của chương trình.
</commit_message>
<xml_diff>
--- a/Outline thesis/De cuong/Kientrucdetai_23_8.pptx
+++ b/Outline thesis/De cuong/Kientrucdetai_23_8.pptx
@@ -7,7 +7,7 @@
   <p:sldIdLst>
     <p:sldId id="256" r:id="rId2"/>
     <p:sldId id="257" r:id="rId3"/>
-    <p:sldId id="258" r:id="rId4"/>
+    <p:sldId id="260" r:id="rId4"/>
     <p:sldId id="259" r:id="rId5"/>
   </p:sldIdLst>
   <p:sldSz cx="9144000" cy="6858000" type="screen4x3"/>
@@ -292,7 +292,7 @@
             <a:fld id="{1D8BD707-D9CF-40AE-B4C6-C98DA3205C09}" type="datetimeFigureOut">
               <a:rPr lang="en-US" smtClean="0"/>
               <a:pPr/>
-              <a:t>8/23/2010</a:t>
+              <a:t>8/24/2010</a:t>
             </a:fld>
             <a:endParaRPr lang="en-US"/>
           </a:p>
@@ -459,7 +459,7 @@
             <a:fld id="{1D8BD707-D9CF-40AE-B4C6-C98DA3205C09}" type="datetimeFigureOut">
               <a:rPr lang="en-US" smtClean="0"/>
               <a:pPr/>
-              <a:t>8/23/2010</a:t>
+              <a:t>8/24/2010</a:t>
             </a:fld>
             <a:endParaRPr lang="en-US"/>
           </a:p>
@@ -636,7 +636,7 @@
             <a:fld id="{1D8BD707-D9CF-40AE-B4C6-C98DA3205C09}" type="datetimeFigureOut">
               <a:rPr lang="en-US" smtClean="0"/>
               <a:pPr/>
-              <a:t>8/23/2010</a:t>
+              <a:t>8/24/2010</a:t>
             </a:fld>
             <a:endParaRPr lang="en-US"/>
           </a:p>
@@ -803,7 +803,7 @@
             <a:fld id="{1D8BD707-D9CF-40AE-B4C6-C98DA3205C09}" type="datetimeFigureOut">
               <a:rPr lang="en-US" smtClean="0"/>
               <a:pPr/>
-              <a:t>8/23/2010</a:t>
+              <a:t>8/24/2010</a:t>
             </a:fld>
             <a:endParaRPr lang="en-US"/>
           </a:p>
@@ -1046,7 +1046,7 @@
             <a:fld id="{1D8BD707-D9CF-40AE-B4C6-C98DA3205C09}" type="datetimeFigureOut">
               <a:rPr lang="en-US" smtClean="0"/>
               <a:pPr/>
-              <a:t>8/23/2010</a:t>
+              <a:t>8/24/2010</a:t>
             </a:fld>
             <a:endParaRPr lang="en-US"/>
           </a:p>
@@ -1331,7 +1331,7 @@
             <a:fld id="{1D8BD707-D9CF-40AE-B4C6-C98DA3205C09}" type="datetimeFigureOut">
               <a:rPr lang="en-US" smtClean="0"/>
               <a:pPr/>
-              <a:t>8/23/2010</a:t>
+              <a:t>8/24/2010</a:t>
             </a:fld>
             <a:endParaRPr lang="en-US"/>
           </a:p>
@@ -1750,7 +1750,7 @@
             <a:fld id="{1D8BD707-D9CF-40AE-B4C6-C98DA3205C09}" type="datetimeFigureOut">
               <a:rPr lang="en-US" smtClean="0"/>
               <a:pPr/>
-              <a:t>8/23/2010</a:t>
+              <a:t>8/24/2010</a:t>
             </a:fld>
             <a:endParaRPr lang="en-US"/>
           </a:p>
@@ -1865,7 +1865,7 @@
             <a:fld id="{1D8BD707-D9CF-40AE-B4C6-C98DA3205C09}" type="datetimeFigureOut">
               <a:rPr lang="en-US" smtClean="0"/>
               <a:pPr/>
-              <a:t>8/23/2010</a:t>
+              <a:t>8/24/2010</a:t>
             </a:fld>
             <a:endParaRPr lang="en-US"/>
           </a:p>
@@ -1957,7 +1957,7 @@
             <a:fld id="{1D8BD707-D9CF-40AE-B4C6-C98DA3205C09}" type="datetimeFigureOut">
               <a:rPr lang="en-US" smtClean="0"/>
               <a:pPr/>
-              <a:t>8/23/2010</a:t>
+              <a:t>8/24/2010</a:t>
             </a:fld>
             <a:endParaRPr lang="en-US"/>
           </a:p>
@@ -2231,7 +2231,7 @@
             <a:fld id="{1D8BD707-D9CF-40AE-B4C6-C98DA3205C09}" type="datetimeFigureOut">
               <a:rPr lang="en-US" smtClean="0"/>
               <a:pPr/>
-              <a:t>8/23/2010</a:t>
+              <a:t>8/24/2010</a:t>
             </a:fld>
             <a:endParaRPr lang="en-US"/>
           </a:p>
@@ -2481,7 +2481,7 @@
             <a:fld id="{1D8BD707-D9CF-40AE-B4C6-C98DA3205C09}" type="datetimeFigureOut">
               <a:rPr lang="en-US" smtClean="0"/>
               <a:pPr/>
-              <a:t>8/23/2010</a:t>
+              <a:t>8/24/2010</a:t>
             </a:fld>
             <a:endParaRPr lang="en-US"/>
           </a:p>
@@ -2691,7 +2691,7 @@
             <a:fld id="{1D8BD707-D9CF-40AE-B4C6-C98DA3205C09}" type="datetimeFigureOut">
               <a:rPr lang="en-US" smtClean="0"/>
               <a:pPr/>
-              <a:t>8/23/2010</a:t>
+              <a:t>8/24/2010</a:t>
             </a:fld>
             <a:endParaRPr lang="en-US"/>
           </a:p>
@@ -3474,10 +3474,6 @@
               </a:rPr>
               <a:t> </a:t>
             </a:r>
-            <a:endParaRPr lang="en-US" b="1" dirty="0" smtClean="0">
-              <a:latin typeface="Times New Roman" pitchFamily="18" charset="0"/>
-              <a:cs typeface="Times New Roman" pitchFamily="18" charset="0"/>
-            </a:endParaRPr>
           </a:p>
           <a:p>
             <a:pPr algn="ctr"/>
@@ -3650,7 +3646,7 @@
         </p:nvSpPr>
         <p:spPr>
           <a:xfrm>
-            <a:off x="8153400" y="2362200"/>
+            <a:off x="7239000" y="2438400"/>
             <a:ext cx="838200" cy="990600"/>
           </a:xfrm>
           <a:prstGeom prst="flowChartMagneticDisk">
@@ -3752,13 +3748,6 @@
               </a:rPr>
               <a:t>Digital Library</a:t>
             </a:r>
-            <a:endParaRPr lang="en-US" sz="1600" dirty="0" smtClean="0">
-              <a:solidFill>
-                <a:schemeClr val="tx1"/>
-              </a:solidFill>
-              <a:latin typeface="Times New Roman" pitchFamily="18" charset="0"/>
-              <a:cs typeface="Times New Roman" pitchFamily="18" charset="0"/>
-            </a:endParaRPr>
           </a:p>
           <a:p>
             <a:pPr algn="ctr"/>
@@ -3857,13 +3846,6 @@
               </a:rPr>
               <a:t>Import existing database</a:t>
             </a:r>
-            <a:endParaRPr lang="en-US" sz="1600" dirty="0" smtClean="0">
-              <a:solidFill>
-                <a:schemeClr val="tx1"/>
-              </a:solidFill>
-              <a:latin typeface="Times New Roman" pitchFamily="18" charset="0"/>
-              <a:cs typeface="Times New Roman" pitchFamily="18" charset="0"/>
-            </a:endParaRPr>
           </a:p>
         </p:txBody>
       </p:sp>
@@ -3999,114 +3981,14 @@
       </p:cxnSp>
       <p:sp>
         <p:nvSpPr>
-          <p:cNvPr id="56" name="Flowchart: Multidocument 55"/>
-          <p:cNvSpPr/>
-          <p:nvPr/>
-        </p:nvSpPr>
-        <p:spPr>
-          <a:xfrm>
-            <a:off x="6172200" y="2209800"/>
-            <a:ext cx="1365504" cy="1447800"/>
-          </a:xfrm>
-          <a:prstGeom prst="flowChartMultidocument">
-            <a:avLst/>
-          </a:prstGeom>
-          <a:noFill/>
-        </p:spPr>
-        <p:style>
-          <a:lnRef idx="2">
-            <a:schemeClr val="accent1">
-              <a:shade val="50000"/>
-            </a:schemeClr>
-          </a:lnRef>
-          <a:fillRef idx="1">
-            <a:schemeClr val="accent1"/>
-          </a:fillRef>
-          <a:effectRef idx="0">
-            <a:schemeClr val="accent1"/>
-          </a:effectRef>
-          <a:fontRef idx="minor">
-            <a:schemeClr val="lt1"/>
-          </a:fontRef>
-        </p:style>
-        <p:txBody>
-          <a:bodyPr rtlCol="0" anchor="ctr"/>
-          <a:lstStyle/>
-          <a:p>
-            <a:pPr algn="ctr"/>
-            <a:r>
-              <a:rPr lang="en-US" dirty="0" smtClean="0">
-                <a:solidFill>
-                  <a:schemeClr val="tx1"/>
-                </a:solidFill>
-                <a:latin typeface="Times New Roman" pitchFamily="18" charset="0"/>
-                <a:cs typeface="Times New Roman" pitchFamily="18" charset="0"/>
-              </a:rPr>
-              <a:t>Check existing </a:t>
-            </a:r>
-            <a:endParaRPr lang="en-US" dirty="0" smtClean="0">
-              <a:solidFill>
-                <a:schemeClr val="tx1"/>
-              </a:solidFill>
-              <a:latin typeface="Times New Roman" pitchFamily="18" charset="0"/>
-              <a:cs typeface="Times New Roman" pitchFamily="18" charset="0"/>
-            </a:endParaRPr>
-          </a:p>
-        </p:txBody>
-      </p:sp>
-      <p:sp>
-        <p:nvSpPr>
-          <p:cNvPr id="59" name="Right Arrow 58"/>
-          <p:cNvSpPr/>
-          <p:nvPr/>
-        </p:nvSpPr>
-        <p:spPr>
-          <a:xfrm>
-            <a:off x="5943600" y="2819400"/>
-            <a:ext cx="228600" cy="228600"/>
-          </a:xfrm>
-          <a:prstGeom prst="rightArrow">
-            <a:avLst/>
-          </a:prstGeom>
-        </p:spPr>
-        <p:style>
-          <a:lnRef idx="2">
-            <a:schemeClr val="accent1">
-              <a:shade val="50000"/>
-            </a:schemeClr>
-          </a:lnRef>
-          <a:fillRef idx="1">
-            <a:schemeClr val="accent1"/>
-          </a:fillRef>
-          <a:effectRef idx="0">
-            <a:schemeClr val="accent1"/>
-          </a:effectRef>
-          <a:fontRef idx="minor">
-            <a:schemeClr val="lt1"/>
-          </a:fontRef>
-        </p:style>
-        <p:txBody>
-          <a:bodyPr rtlCol="0" anchor="ctr"/>
-          <a:lstStyle/>
-          <a:p>
-            <a:pPr algn="ctr"/>
-            <a:endParaRPr lang="en-US">
-              <a:latin typeface="Times New Roman" pitchFamily="18" charset="0"/>
-              <a:cs typeface="Times New Roman" pitchFamily="18" charset="0"/>
-            </a:endParaRPr>
-          </a:p>
-        </p:txBody>
-      </p:sp>
-      <p:sp>
-        <p:nvSpPr>
           <p:cNvPr id="61" name="Left-Right Arrow 60"/>
           <p:cNvSpPr/>
           <p:nvPr/>
         </p:nvSpPr>
         <p:spPr>
           <a:xfrm>
-            <a:off x="7543800" y="2819400"/>
-            <a:ext cx="533400" cy="228600"/>
+            <a:off x="5943600" y="2819400"/>
+            <a:ext cx="1219200" cy="228600"/>
           </a:xfrm>
           <a:prstGeom prst="leftRightArrow">
             <a:avLst/>
@@ -4343,15 +4225,7 @@
           <a:p>
             <a:r>
               <a:rPr lang="en-US" b="1" dirty="0" smtClean="0"/>
-              <a:t>(1) </a:t>
-            </a:r>
-            <a:r>
-              <a:rPr lang="en-US" b="1" dirty="0" smtClean="0"/>
-              <a:t>Module C</a:t>
-            </a:r>
-            <a:r>
-              <a:rPr lang="en-US" b="1" dirty="0" smtClean="0"/>
-              <a:t>ollections</a:t>
+              <a:t>(1) Module Collections</a:t>
             </a:r>
             <a:endParaRPr lang="en-US" b="1" dirty="0"/>
           </a:p>
@@ -4688,11 +4562,7 @@
             <a:pPr algn="ctr"/>
             <a:r>
               <a:rPr lang="en-US" dirty="0" smtClean="0"/>
-              <a:t>Papers </a:t>
-            </a:r>
-            <a:r>
-              <a:rPr lang="en-US" dirty="0" smtClean="0"/>
-              <a:t>Information</a:t>
+              <a:t>Papers Information</a:t>
             </a:r>
           </a:p>
         </p:txBody>
@@ -4779,48 +4649,60 @@
           <a:chExt cx="0" cy="0"/>
         </a:xfrm>
       </p:grpSpPr>
-      <p:pic>
-        <p:nvPicPr>
-          <p:cNvPr id="4" name="Picture 2" descr="C:\Program Files\Microsoft Office\MEDIA\CAGCAT10\j0292020.wmf"/>
-          <p:cNvPicPr>
-            <a:picLocks noChangeAspect="1" noChangeArrowheads="1"/>
-          </p:cNvPicPr>
+      <p:sp>
+        <p:nvSpPr>
+          <p:cNvPr id="6" name="TextBox 5"/>
+          <p:cNvSpPr txBox="1"/>
           <p:nvPr/>
-        </p:nvPicPr>
-        <p:blipFill>
-          <a:blip r:embed="rId2"/>
-          <a:srcRect/>
-          <a:stretch>
-            <a:fillRect/>
-          </a:stretch>
-        </p:blipFill>
-        <p:spPr bwMode="auto">
+        </p:nvSpPr>
+        <p:spPr>
           <a:xfrm>
-            <a:off x="457200" y="2286000"/>
-            <a:ext cx="940098" cy="892175"/>
+            <a:off x="3657600" y="5791200"/>
+            <a:ext cx="2629246" cy="369332"/>
           </a:xfrm>
           <a:prstGeom prst="rect">
             <a:avLst/>
           </a:prstGeom>
           <a:noFill/>
         </p:spPr>
-      </p:pic>
-      <p:sp>
-        <p:nvSpPr>
-          <p:cNvPr id="7" name="Cloud Callout 6"/>
+        <p:txBody>
+          <a:bodyPr wrap="none" rtlCol="0">
+            <a:spAutoFit/>
+          </a:bodyPr>
+          <a:lstStyle/>
+          <a:p>
+            <a:r>
+              <a:rPr lang="en-US" b="1" dirty="0" smtClean="0"/>
+              <a:t>(2) </a:t>
+            </a:r>
+            <a:r>
+              <a:rPr lang="en-US" b="1" dirty="0" smtClean="0"/>
+              <a:t>Module </a:t>
+            </a:r>
+            <a:r>
+              <a:rPr lang="en-US" b="1" dirty="0" smtClean="0">
+                <a:latin typeface="Times New Roman" pitchFamily="18" charset="0"/>
+                <a:cs typeface="Times New Roman" pitchFamily="18" charset="0"/>
+              </a:rPr>
+              <a:t>Classification</a:t>
+            </a:r>
+            <a:endParaRPr lang="en-US" b="1" dirty="0"/>
+          </a:p>
+        </p:txBody>
+      </p:sp>
+      <p:sp>
+        <p:nvSpPr>
+          <p:cNvPr id="15" name="Flowchart: Multidocument 14"/>
           <p:cNvSpPr/>
           <p:nvPr/>
         </p:nvSpPr>
         <p:spPr>
           <a:xfrm>
-            <a:off x="1219200" y="914400"/>
-            <a:ext cx="1905000" cy="1222248"/>
-          </a:xfrm>
-          <a:prstGeom prst="cloudCallout">
-            <a:avLst>
-              <a:gd name="adj1" fmla="val -46909"/>
-              <a:gd name="adj2" fmla="val 73300"/>
-            </a:avLst>
+            <a:off x="6781800" y="457200"/>
+            <a:ext cx="838200" cy="990600"/>
+          </a:xfrm>
+          <a:prstGeom prst="flowChartMultidocument">
+            <a:avLst/>
           </a:prstGeom>
           <a:noFill/>
         </p:spPr>
@@ -4846,14 +4728,14 @@
           <a:p>
             <a:pPr algn="ctr"/>
             <a:r>
-              <a:rPr lang="en-US" sz="1600" dirty="0" smtClean="0">
+              <a:rPr lang="en-US" sz="1300" dirty="0" smtClean="0">
                 <a:solidFill>
                   <a:schemeClr val="tx1"/>
                 </a:solidFill>
               </a:rPr>
-              <a:t>Keywords</a:t>
-            </a:r>
-            <a:endParaRPr lang="en-US" sz="1600" dirty="0">
+              <a:t>Data training</a:t>
+            </a:r>
+            <a:endParaRPr lang="en-US" sz="1300" dirty="0">
               <a:solidFill>
                 <a:schemeClr val="tx1"/>
               </a:solidFill>
@@ -4861,267 +4743,20 @@
           </a:p>
         </p:txBody>
       </p:sp>
-      <p:cxnSp>
-        <p:nvCxnSpPr>
-          <p:cNvPr id="9" name="Straight Arrow Connector 8"/>
-          <p:cNvCxnSpPr>
-            <a:stCxn id="4" idx="3"/>
-            <a:endCxn id="10" idx="1"/>
-          </p:cNvCxnSpPr>
+      <p:sp>
+        <p:nvSpPr>
+          <p:cNvPr id="17" name="Flowchart: Predefined Process 16"/>
+          <p:cNvSpPr/>
           <p:nvPr/>
-        </p:nvCxnSpPr>
+        </p:nvSpPr>
         <p:spPr>
           <a:xfrm>
-            <a:off x="1397298" y="2732088"/>
-            <a:ext cx="1269702" cy="12636"/>
-          </a:xfrm>
-          <a:prstGeom prst="straightConnector1">
+            <a:off x="4191000" y="1143000"/>
+            <a:ext cx="1447800" cy="762000"/>
+          </a:xfrm>
+          <a:prstGeom prst="flowChartPredefinedProcess">
             <a:avLst/>
           </a:prstGeom>
-          <a:ln>
-            <a:tailEnd type="arrow"/>
-          </a:ln>
-        </p:spPr>
-        <p:style>
-          <a:lnRef idx="1">
-            <a:schemeClr val="accent1"/>
-          </a:lnRef>
-          <a:fillRef idx="0">
-            <a:schemeClr val="accent1"/>
-          </a:fillRef>
-          <a:effectRef idx="0">
-            <a:schemeClr val="accent1"/>
-          </a:effectRef>
-          <a:fontRef idx="minor">
-            <a:schemeClr val="tx1"/>
-          </a:fontRef>
-        </p:style>
-      </p:cxnSp>
-      <p:cxnSp>
-        <p:nvCxnSpPr>
-          <p:cNvPr id="21" name="Straight Arrow Connector 20"/>
-          <p:cNvCxnSpPr>
-            <a:stCxn id="10" idx="3"/>
-            <a:endCxn id="18" idx="1"/>
-          </p:cNvCxnSpPr>
-          <p:nvPr/>
-        </p:nvCxnSpPr>
-        <p:spPr>
-          <a:xfrm>
-            <a:off x="3733800" y="2744724"/>
-            <a:ext cx="609600" cy="1588"/>
-          </a:xfrm>
-          <a:prstGeom prst="straightConnector1">
-            <a:avLst/>
-          </a:prstGeom>
-          <a:ln>
-            <a:tailEnd type="arrow"/>
-          </a:ln>
-        </p:spPr>
-        <p:style>
-          <a:lnRef idx="1">
-            <a:schemeClr val="accent1"/>
-          </a:lnRef>
-          <a:fillRef idx="0">
-            <a:schemeClr val="accent1"/>
-          </a:fillRef>
-          <a:effectRef idx="0">
-            <a:schemeClr val="accent1"/>
-          </a:effectRef>
-          <a:fontRef idx="minor">
-            <a:schemeClr val="tx1"/>
-          </a:fontRef>
-        </p:style>
-      </p:cxnSp>
-      <p:sp>
-        <p:nvSpPr>
-          <p:cNvPr id="25" name="TextBox 24"/>
-          <p:cNvSpPr txBox="1"/>
-          <p:nvPr/>
-        </p:nvSpPr>
-        <p:spPr>
-          <a:xfrm>
-            <a:off x="1295400" y="4191000"/>
-            <a:ext cx="6477000" cy="1200329"/>
-          </a:xfrm>
-          <a:prstGeom prst="rect">
-            <a:avLst/>
-          </a:prstGeom>
-          <a:noFill/>
-        </p:spPr>
-        <p:txBody>
-          <a:bodyPr wrap="square" rtlCol="0">
-            <a:spAutoFit/>
-          </a:bodyPr>
-          <a:lstStyle/>
-          <a:p>
-            <a:r>
-              <a:rPr lang="en-US" dirty="0" smtClean="0"/>
-              <a:t>-Keywords: </a:t>
-            </a:r>
-            <a:r>
-              <a:rPr lang="en-US" dirty="0" err="1" smtClean="0"/>
-              <a:t>Bao</a:t>
-            </a:r>
-            <a:r>
-              <a:rPr lang="en-US" dirty="0" smtClean="0"/>
-              <a:t> </a:t>
-            </a:r>
-            <a:r>
-              <a:rPr lang="en-US" dirty="0" err="1" smtClean="0"/>
-              <a:t>gồm</a:t>
-            </a:r>
-            <a:r>
-              <a:rPr lang="en-US" dirty="0" smtClean="0"/>
-              <a:t> </a:t>
-            </a:r>
-            <a:r>
-              <a:rPr lang="en-US" dirty="0" err="1" smtClean="0"/>
-              <a:t>tên</a:t>
-            </a:r>
-            <a:r>
-              <a:rPr lang="en-US" dirty="0" smtClean="0"/>
-              <a:t> </a:t>
-            </a:r>
-            <a:r>
-              <a:rPr lang="en-US" dirty="0" err="1" smtClean="0"/>
-              <a:t>bài</a:t>
-            </a:r>
-            <a:r>
-              <a:rPr lang="en-US" dirty="0" smtClean="0"/>
-              <a:t> </a:t>
-            </a:r>
-            <a:r>
-              <a:rPr lang="en-US" dirty="0" err="1" smtClean="0"/>
-              <a:t>báo,tác</a:t>
-            </a:r>
-            <a:r>
-              <a:rPr lang="en-US" dirty="0" smtClean="0"/>
-              <a:t> </a:t>
-            </a:r>
-            <a:r>
-              <a:rPr lang="en-US" dirty="0" err="1" smtClean="0"/>
-              <a:t>giả,tên</a:t>
-            </a:r>
-            <a:r>
-              <a:rPr lang="en-US" dirty="0" smtClean="0"/>
-              <a:t> </a:t>
-            </a:r>
-            <a:r>
-              <a:rPr lang="en-US" dirty="0" err="1" smtClean="0"/>
-              <a:t>chủ</a:t>
-            </a:r>
-            <a:r>
-              <a:rPr lang="en-US" dirty="0" smtClean="0"/>
-              <a:t> </a:t>
-            </a:r>
-            <a:r>
-              <a:rPr lang="en-US" dirty="0" err="1" smtClean="0"/>
-              <a:t>đề,chuyên</a:t>
-            </a:r>
-            <a:r>
-              <a:rPr lang="en-US" dirty="0" smtClean="0"/>
-              <a:t> </a:t>
-            </a:r>
-            <a:r>
-              <a:rPr lang="en-US" dirty="0" err="1" smtClean="0"/>
-              <a:t>đề,hội</a:t>
-            </a:r>
-            <a:r>
-              <a:rPr lang="en-US" dirty="0" smtClean="0"/>
-              <a:t> </a:t>
-            </a:r>
-            <a:r>
-              <a:rPr lang="en-US" dirty="0" err="1" smtClean="0"/>
-              <a:t>nghị</a:t>
-            </a:r>
-            <a:r>
-              <a:rPr lang="en-US" dirty="0" smtClean="0"/>
-              <a:t> .</a:t>
-            </a:r>
-          </a:p>
-          <a:p>
-            <a:r>
-              <a:rPr lang="en-US" dirty="0" smtClean="0"/>
-              <a:t>Links : </a:t>
-            </a:r>
-            <a:r>
-              <a:rPr lang="en-US" dirty="0" err="1" smtClean="0"/>
-              <a:t>là</a:t>
-            </a:r>
-            <a:r>
-              <a:rPr lang="en-US" dirty="0" smtClean="0"/>
-              <a:t> </a:t>
-            </a:r>
-            <a:r>
-              <a:rPr lang="en-US" dirty="0" err="1" smtClean="0"/>
-              <a:t>các</a:t>
-            </a:r>
-            <a:r>
-              <a:rPr lang="en-US" dirty="0" smtClean="0"/>
-              <a:t> </a:t>
-            </a:r>
-            <a:r>
-              <a:rPr lang="en-US" dirty="0" err="1" smtClean="0"/>
-              <a:t>đường</a:t>
-            </a:r>
-            <a:r>
-              <a:rPr lang="en-US" dirty="0" smtClean="0"/>
-              <a:t> links </a:t>
-            </a:r>
-            <a:r>
-              <a:rPr lang="en-US" dirty="0" err="1" smtClean="0"/>
-              <a:t>được</a:t>
-            </a:r>
-            <a:r>
-              <a:rPr lang="en-US" dirty="0" smtClean="0"/>
-              <a:t> </a:t>
-            </a:r>
-            <a:r>
-              <a:rPr lang="en-US" dirty="0" err="1" smtClean="0"/>
-              <a:t>trả</a:t>
-            </a:r>
-            <a:r>
-              <a:rPr lang="en-US" dirty="0" smtClean="0"/>
-              <a:t> </a:t>
-            </a:r>
-            <a:r>
-              <a:rPr lang="en-US" dirty="0" err="1" smtClean="0"/>
-              <a:t>về</a:t>
-            </a:r>
-            <a:r>
-              <a:rPr lang="en-US" dirty="0" smtClean="0"/>
-              <a:t> </a:t>
-            </a:r>
-            <a:r>
-              <a:rPr lang="en-US" dirty="0" err="1" smtClean="0"/>
-              <a:t>từ</a:t>
-            </a:r>
-            <a:r>
-              <a:rPr lang="en-US" dirty="0" smtClean="0"/>
-              <a:t> search engine.</a:t>
-            </a:r>
-          </a:p>
-          <a:p>
-            <a:endParaRPr lang="en-US" dirty="0" smtClean="0"/>
-          </a:p>
-        </p:txBody>
-      </p:sp>
-      <p:sp>
-        <p:nvSpPr>
-          <p:cNvPr id="10" name="Flowchart: Document 9"/>
-          <p:cNvSpPr/>
-          <p:nvPr/>
-        </p:nvSpPr>
-        <p:spPr>
-          <a:xfrm>
-            <a:off x="2667000" y="2286000"/>
-            <a:ext cx="1066800" cy="917448"/>
-          </a:xfrm>
-          <a:prstGeom prst="flowChartDocument">
-            <a:avLst/>
-          </a:prstGeom>
-          <a:noFill/>
         </p:spPr>
         <p:style>
           <a:lnRef idx="2">
@@ -5145,47 +4780,34 @@
           <a:p>
             <a:pPr algn="ctr"/>
             <a:r>
-              <a:rPr lang="en-US" dirty="0" smtClean="0">
-                <a:solidFill>
-                  <a:schemeClr val="tx1"/>
-                </a:solidFill>
-              </a:rPr>
-              <a:t>Search Engine</a:t>
+              <a:rPr lang="en-US" sz="1300" dirty="0" smtClean="0"/>
+              <a:t>Classification</a:t>
             </a:r>
           </a:p>
           <a:p>
             <a:pPr algn="ctr"/>
             <a:r>
-              <a:rPr lang="en-US" dirty="0" smtClean="0">
-                <a:solidFill>
-                  <a:schemeClr val="tx1"/>
-                </a:solidFill>
-              </a:rPr>
-              <a:t>(Scholar)</a:t>
-            </a:r>
-            <a:endParaRPr lang="en-US" dirty="0">
-              <a:solidFill>
-                <a:schemeClr val="tx1"/>
-              </a:solidFill>
-            </a:endParaRPr>
-          </a:p>
-        </p:txBody>
-      </p:sp>
-      <p:sp>
-        <p:nvSpPr>
-          <p:cNvPr id="18" name="Flowchart: Document 17"/>
+              <a:rPr lang="en-US" sz="1300" dirty="0" smtClean="0"/>
+              <a:t>Frame</a:t>
+            </a:r>
+            <a:endParaRPr lang="en-US" sz="1300" dirty="0"/>
+          </a:p>
+        </p:txBody>
+      </p:sp>
+      <p:sp>
+        <p:nvSpPr>
+          <p:cNvPr id="22" name="Rectangle 21"/>
           <p:cNvSpPr/>
           <p:nvPr/>
         </p:nvSpPr>
         <p:spPr>
           <a:xfrm>
-            <a:off x="4343400" y="2362200"/>
-            <a:ext cx="914400" cy="765048"/>
-          </a:xfrm>
-          <a:prstGeom prst="flowChartDocument">
+            <a:off x="3505200" y="4572000"/>
+            <a:ext cx="1828800" cy="762000"/>
+          </a:xfrm>
+          <a:prstGeom prst="rect">
             <a:avLst/>
           </a:prstGeom>
-          <a:noFill/>
         </p:spPr>
         <p:style>
           <a:lnRef idx="2">
@@ -5209,36 +4831,30 @@
           <a:p>
             <a:pPr algn="ctr"/>
             <a:r>
-              <a:rPr lang="en-US" dirty="0" smtClean="0">
-                <a:solidFill>
-                  <a:schemeClr val="tx1"/>
-                </a:solidFill>
-              </a:rPr>
-              <a:t>Links</a:t>
-            </a:r>
-            <a:endParaRPr lang="en-US" dirty="0">
-              <a:solidFill>
-                <a:schemeClr val="tx1"/>
-              </a:solidFill>
-            </a:endParaRPr>
-          </a:p>
-        </p:txBody>
-      </p:sp>
-      <p:sp>
-        <p:nvSpPr>
-          <p:cNvPr id="31" name="Flowchart: Multidocument 30"/>
+              <a:rPr lang="en-US" dirty="0" smtClean="0"/>
+              <a:t>SVM</a:t>
+            </a:r>
+            <a:endParaRPr lang="en-US" dirty="0"/>
+          </a:p>
+        </p:txBody>
+      </p:sp>
+      <p:sp>
+        <p:nvSpPr>
+          <p:cNvPr id="24" name="Flowchart: Document 23"/>
           <p:cNvSpPr/>
           <p:nvPr/>
         </p:nvSpPr>
         <p:spPr>
           <a:xfrm>
-            <a:off x="5943600" y="2133600"/>
-            <a:ext cx="1365504" cy="1219200"/>
-          </a:xfrm>
-          <a:prstGeom prst="flowChartMultidocument">
+            <a:off x="228600" y="1676400"/>
+            <a:ext cx="762000" cy="838200"/>
+          </a:xfrm>
+          <a:prstGeom prst="flowChartDocument">
             <a:avLst/>
           </a:prstGeom>
-          <a:noFill/>
+          <a:solidFill>
+            <a:schemeClr val="accent1"/>
+          </a:solidFill>
         </p:spPr>
         <p:style>
           <a:lnRef idx="2">
@@ -5262,25 +4878,14 @@
           <a:p>
             <a:pPr algn="ctr"/>
             <a:r>
-              <a:rPr lang="en-US" dirty="0" smtClean="0">
+              <a:rPr lang="en-US" sz="1300" dirty="0" err="1" smtClean="0">
                 <a:solidFill>
                   <a:schemeClr val="tx1"/>
                 </a:solidFill>
               </a:rPr>
-              <a:t>Crawl</a:t>
-            </a:r>
-          </a:p>
-          <a:p>
-            <a:pPr algn="ctr"/>
-            <a:r>
-              <a:rPr lang="en-US" dirty="0" smtClean="0">
-                <a:solidFill>
-                  <a:schemeClr val="tx1"/>
-                </a:solidFill>
-              </a:rPr>
-              <a:t>API</a:t>
-            </a:r>
-            <a:endParaRPr lang="en-US" dirty="0">
+              <a:t>Abtract</a:t>
+            </a:r>
+            <a:endParaRPr lang="en-US" sz="1300" dirty="0" smtClean="0">
               <a:solidFill>
                 <a:schemeClr val="tx1"/>
               </a:solidFill>
@@ -5288,92 +4893,81 @@
           </a:p>
         </p:txBody>
       </p:sp>
-      <p:cxnSp>
-        <p:nvCxnSpPr>
-          <p:cNvPr id="33" name="Straight Arrow Connector 32"/>
-          <p:cNvCxnSpPr>
-            <a:stCxn id="18" idx="3"/>
-            <a:endCxn id="31" idx="1"/>
-          </p:cNvCxnSpPr>
+      <p:sp>
+        <p:nvSpPr>
+          <p:cNvPr id="25" name="Rectangle 24"/>
+          <p:cNvSpPr/>
           <p:nvPr/>
-        </p:nvCxnSpPr>
-        <p:spPr>
-          <a:xfrm flipV="1">
-            <a:off x="5257800" y="2743200"/>
-            <a:ext cx="685800" cy="1524"/>
-          </a:xfrm>
-          <a:prstGeom prst="straightConnector1">
+        </p:nvSpPr>
+        <p:spPr>
+          <a:xfrm>
+            <a:off x="152400" y="1219200"/>
+            <a:ext cx="865044" cy="369332"/>
+          </a:xfrm>
+          <a:prstGeom prst="rect">
             <a:avLst/>
           </a:prstGeom>
-          <a:ln>
-            <a:tailEnd type="arrow"/>
-          </a:ln>
-        </p:spPr>
-        <p:style>
-          <a:lnRef idx="1">
-            <a:schemeClr val="accent1"/>
-          </a:lnRef>
-          <a:fillRef idx="0">
-            <a:schemeClr val="accent1"/>
-          </a:fillRef>
-          <a:effectRef idx="0">
-            <a:schemeClr val="accent1"/>
-          </a:effectRef>
-          <a:fontRef idx="minor">
-            <a:schemeClr val="tx1"/>
-          </a:fontRef>
-        </p:style>
-      </p:cxnSp>
-      <p:cxnSp>
-        <p:nvCxnSpPr>
-          <p:cNvPr id="38" name="Straight Arrow Connector 37"/>
-          <p:cNvCxnSpPr>
-            <a:stCxn id="31" idx="3"/>
-            <a:endCxn id="45" idx="2"/>
-          </p:cNvCxnSpPr>
+        </p:spPr>
+        <p:txBody>
+          <a:bodyPr wrap="none">
+            <a:spAutoFit/>
+          </a:bodyPr>
+          <a:lstStyle/>
+          <a:p>
+            <a:pPr algn="ctr"/>
+            <a:r>
+              <a:rPr lang="en-US" dirty="0" smtClean="0"/>
+              <a:t>Papers </a:t>
+            </a:r>
+          </a:p>
+        </p:txBody>
+      </p:sp>
+      <p:sp>
+        <p:nvSpPr>
+          <p:cNvPr id="26" name="Rectangle 25"/>
+          <p:cNvSpPr/>
           <p:nvPr/>
-        </p:nvCxnSpPr>
+        </p:nvSpPr>
         <p:spPr>
           <a:xfrm>
-            <a:off x="7309104" y="2743200"/>
-            <a:ext cx="387096" cy="1588"/>
-          </a:xfrm>
-          <a:prstGeom prst="straightConnector1">
+            <a:off x="6858000" y="0"/>
+            <a:ext cx="865044" cy="369332"/>
+          </a:xfrm>
+          <a:prstGeom prst="rect">
             <a:avLst/>
           </a:prstGeom>
-          <a:ln>
-            <a:tailEnd type="arrow"/>
-          </a:ln>
-        </p:spPr>
-        <p:style>
-          <a:lnRef idx="1">
-            <a:schemeClr val="accent1"/>
-          </a:lnRef>
-          <a:fillRef idx="0">
-            <a:schemeClr val="accent1"/>
-          </a:fillRef>
-          <a:effectRef idx="0">
-            <a:schemeClr val="accent1"/>
-          </a:effectRef>
-          <a:fontRef idx="minor">
-            <a:schemeClr val="tx1"/>
-          </a:fontRef>
-        </p:style>
-      </p:cxnSp>
-      <p:sp>
-        <p:nvSpPr>
-          <p:cNvPr id="45" name="Snip and Round Single Corner Rectangle 44"/>
+        </p:spPr>
+        <p:txBody>
+          <a:bodyPr wrap="none">
+            <a:spAutoFit/>
+          </a:bodyPr>
+          <a:lstStyle/>
+          <a:p>
+            <a:pPr algn="ctr"/>
+            <a:r>
+              <a:rPr lang="en-US" dirty="0" smtClean="0"/>
+              <a:t>Papers </a:t>
+            </a:r>
+          </a:p>
+        </p:txBody>
+      </p:sp>
+      <p:sp>
+        <p:nvSpPr>
+          <p:cNvPr id="27" name="Flowchart: Document 26"/>
           <p:cNvSpPr/>
           <p:nvPr/>
         </p:nvSpPr>
         <p:spPr>
           <a:xfrm>
-            <a:off x="7696200" y="2209800"/>
-            <a:ext cx="1219200" cy="1066800"/>
-          </a:xfrm>
-          <a:prstGeom prst="snipRoundRect">
+            <a:off x="6858000" y="1752600"/>
+            <a:ext cx="762000" cy="838200"/>
+          </a:xfrm>
+          <a:prstGeom prst="flowChartDocument">
             <a:avLst/>
           </a:prstGeom>
+          <a:solidFill>
+            <a:schemeClr val="accent1"/>
+          </a:solidFill>
         </p:spPr>
         <p:style>
           <a:lnRef idx="2">
@@ -5397,96 +4991,102 @@
           <a:p>
             <a:pPr algn="ctr"/>
             <a:r>
-              <a:rPr lang="en-US" dirty="0" smtClean="0"/>
-              <a:t>Module </a:t>
-            </a:r>
-            <a:r>
-              <a:rPr lang="en-US" dirty="0" err="1" smtClean="0"/>
-              <a:t>Phân</a:t>
-            </a:r>
-            <a:r>
-              <a:rPr lang="en-US" dirty="0" smtClean="0"/>
-              <a:t> </a:t>
-            </a:r>
-            <a:r>
-              <a:rPr lang="en-US" dirty="0" err="1" smtClean="0"/>
-              <a:t>lớp</a:t>
-            </a:r>
-            <a:endParaRPr lang="en-US" dirty="0"/>
-          </a:p>
-        </p:txBody>
-      </p:sp>
-      <p:sp>
-        <p:nvSpPr>
-          <p:cNvPr id="48" name="TextBox 47"/>
-          <p:cNvSpPr txBox="1"/>
+              <a:rPr lang="en-US" sz="1300" dirty="0" err="1" smtClean="0">
+                <a:solidFill>
+                  <a:schemeClr val="tx1"/>
+                </a:solidFill>
+              </a:rPr>
+              <a:t>Abtract</a:t>
+            </a:r>
+            <a:endParaRPr lang="en-US" sz="1300" dirty="0" smtClean="0">
+              <a:solidFill>
+                <a:schemeClr val="tx1"/>
+              </a:solidFill>
+            </a:endParaRPr>
+          </a:p>
+        </p:txBody>
+      </p:sp>
+      <p:sp>
+        <p:nvSpPr>
+          <p:cNvPr id="28" name="Flowchart: Alternate Process 27"/>
+          <p:cNvSpPr/>
           <p:nvPr/>
         </p:nvSpPr>
         <p:spPr>
           <a:xfrm>
-            <a:off x="1752600" y="5715000"/>
-            <a:ext cx="4097597" cy="369332"/>
-          </a:xfrm>
-          <a:prstGeom prst="rect">
+            <a:off x="3657600" y="2667000"/>
+            <a:ext cx="1066800" cy="609600"/>
+          </a:xfrm>
+          <a:prstGeom prst="flowChartAlternateProcess">
             <a:avLst/>
           </a:prstGeom>
-          <a:noFill/>
-        </p:spPr>
-        <p:txBody>
-          <a:bodyPr wrap="none" rtlCol="0">
-            <a:spAutoFit/>
-          </a:bodyPr>
-          <a:lstStyle/>
-          <a:p>
-            <a:r>
-              <a:rPr lang="en-US" b="1" dirty="0" smtClean="0"/>
-              <a:t>(2) Module </a:t>
-            </a:r>
-            <a:r>
-              <a:rPr lang="en-US" b="1" dirty="0" err="1" smtClean="0"/>
-              <a:t>khi</a:t>
-            </a:r>
-            <a:r>
-              <a:rPr lang="en-US" b="1" dirty="0" smtClean="0"/>
-              <a:t> </a:t>
-            </a:r>
-            <a:r>
-              <a:rPr lang="en-US" b="1" dirty="0" err="1" smtClean="0"/>
-              <a:t>người</a:t>
-            </a:r>
-            <a:r>
-              <a:rPr lang="en-US" b="1" dirty="0" smtClean="0"/>
-              <a:t> </a:t>
-            </a:r>
-            <a:r>
-              <a:rPr lang="en-US" b="1" dirty="0" err="1" smtClean="0"/>
-              <a:t>dùng</a:t>
-            </a:r>
-            <a:r>
-              <a:rPr lang="en-US" b="1" dirty="0" smtClean="0"/>
-              <a:t> </a:t>
-            </a:r>
-            <a:r>
-              <a:rPr lang="en-US" b="1" dirty="0" err="1" smtClean="0"/>
-              <a:t>nhập</a:t>
-            </a:r>
-            <a:r>
-              <a:rPr lang="en-US" b="1" dirty="0" smtClean="0"/>
-              <a:t> </a:t>
-            </a:r>
-            <a:r>
-              <a:rPr lang="en-US" b="1" dirty="0" err="1" smtClean="0"/>
-              <a:t>từ</a:t>
-            </a:r>
-            <a:r>
-              <a:rPr lang="en-US" b="1" dirty="0" smtClean="0"/>
-              <a:t> </a:t>
-            </a:r>
-            <a:r>
-              <a:rPr lang="en-US" b="1" dirty="0" err="1" smtClean="0"/>
-              <a:t>khóa</a:t>
-            </a:r>
-            <a:endParaRPr lang="en-US" b="1" dirty="0"/>
+        </p:spPr>
+        <p:style>
+          <a:lnRef idx="2">
+            <a:schemeClr val="accent1">
+              <a:shade val="50000"/>
+            </a:schemeClr>
+          </a:lnRef>
+          <a:fillRef idx="1">
+            <a:schemeClr val="accent1"/>
+          </a:fillRef>
+          <a:effectRef idx="0">
+            <a:schemeClr val="accent1"/>
+          </a:effectRef>
+          <a:fontRef idx="minor">
+            <a:schemeClr val="lt1"/>
+          </a:fontRef>
+        </p:style>
+        <p:txBody>
+          <a:bodyPr rtlCol="0" anchor="ctr"/>
+          <a:lstStyle/>
+          <a:p>
+            <a:pPr algn="ctr"/>
+            <a:r>
+              <a:rPr lang="en-US" dirty="0" smtClean="0"/>
+              <a:t>Pre Process</a:t>
+            </a:r>
+            <a:endParaRPr lang="en-US" dirty="0"/>
+          </a:p>
+        </p:txBody>
+      </p:sp>
+      <p:sp>
+        <p:nvSpPr>
+          <p:cNvPr id="29" name="Flowchart: Alternate Process 28"/>
+          <p:cNvSpPr/>
+          <p:nvPr/>
+        </p:nvSpPr>
+        <p:spPr>
+          <a:xfrm>
+            <a:off x="3733800" y="3505200"/>
+            <a:ext cx="990600" cy="609600"/>
+          </a:xfrm>
+          <a:prstGeom prst="flowChartAlternateProcess">
+            <a:avLst/>
+          </a:prstGeom>
+        </p:spPr>
+        <p:style>
+          <a:lnRef idx="2">
+            <a:schemeClr val="accent1">
+              <a:shade val="50000"/>
+            </a:schemeClr>
+          </a:lnRef>
+          <a:fillRef idx="1">
+            <a:schemeClr val="accent1"/>
+          </a:fillRef>
+          <a:effectRef idx="0">
+            <a:schemeClr val="accent1"/>
+          </a:effectRef>
+          <a:fontRef idx="minor">
+            <a:schemeClr val="lt1"/>
+          </a:fontRef>
+        </p:style>
+        <p:txBody>
+          <a:bodyPr rtlCol="0" anchor="ctr"/>
+          <a:lstStyle/>
+          <a:p>
+            <a:pPr algn="ctr"/>
+            <a:endParaRPr lang="en-US" dirty="0"/>
           </a:p>
         </p:txBody>
       </p:sp>
@@ -5758,7 +5358,7 @@
         </p:nvSpPr>
         <p:spPr>
           <a:xfrm>
-            <a:off x="5867400" y="685800"/>
+            <a:off x="5867400" y="762000"/>
             <a:ext cx="1752600" cy="2895600"/>
           </a:xfrm>
           <a:prstGeom prst="roundRect">
@@ -5802,7 +5402,7 @@
         </p:nvSpPr>
         <p:spPr>
           <a:xfrm rot="5400000">
-            <a:off x="1600200" y="3886200"/>
+            <a:off x="1828800" y="3886200"/>
             <a:ext cx="685800" cy="228600"/>
           </a:xfrm>
           <a:prstGeom prst="leftRightArrow">
@@ -5842,7 +5442,7 @@
         </p:nvSpPr>
         <p:spPr>
           <a:xfrm rot="5400000">
-            <a:off x="6400800" y="3810000"/>
+            <a:off x="6400800" y="3886200"/>
             <a:ext cx="685800" cy="228600"/>
           </a:xfrm>
           <a:prstGeom prst="leftRightArrow">

</xml_diff>

<commit_message>
sửa một vài điểm và lỗi chính tả
</commit_message>
<xml_diff>
--- a/Outline thesis/De cuong/Kientrucdetai_23_8.pptx
+++ b/Outline thesis/De cuong/Kientrucdetai_23_8.pptx
@@ -292,7 +292,7 @@
             <a:fld id="{1D8BD707-D9CF-40AE-B4C6-C98DA3205C09}" type="datetimeFigureOut">
               <a:rPr lang="en-US" smtClean="0"/>
               <a:pPr/>
-              <a:t>8/24/2010</a:t>
+              <a:t>8/25/2010</a:t>
             </a:fld>
             <a:endParaRPr lang="en-US"/>
           </a:p>
@@ -459,7 +459,7 @@
             <a:fld id="{1D8BD707-D9CF-40AE-B4C6-C98DA3205C09}" type="datetimeFigureOut">
               <a:rPr lang="en-US" smtClean="0"/>
               <a:pPr/>
-              <a:t>8/24/2010</a:t>
+              <a:t>8/25/2010</a:t>
             </a:fld>
             <a:endParaRPr lang="en-US"/>
           </a:p>
@@ -636,7 +636,7 @@
             <a:fld id="{1D8BD707-D9CF-40AE-B4C6-C98DA3205C09}" type="datetimeFigureOut">
               <a:rPr lang="en-US" smtClean="0"/>
               <a:pPr/>
-              <a:t>8/24/2010</a:t>
+              <a:t>8/25/2010</a:t>
             </a:fld>
             <a:endParaRPr lang="en-US"/>
           </a:p>
@@ -803,7 +803,7 @@
             <a:fld id="{1D8BD707-D9CF-40AE-B4C6-C98DA3205C09}" type="datetimeFigureOut">
               <a:rPr lang="en-US" smtClean="0"/>
               <a:pPr/>
-              <a:t>8/24/2010</a:t>
+              <a:t>8/25/2010</a:t>
             </a:fld>
             <a:endParaRPr lang="en-US"/>
           </a:p>
@@ -1046,7 +1046,7 @@
             <a:fld id="{1D8BD707-D9CF-40AE-B4C6-C98DA3205C09}" type="datetimeFigureOut">
               <a:rPr lang="en-US" smtClean="0"/>
               <a:pPr/>
-              <a:t>8/24/2010</a:t>
+              <a:t>8/25/2010</a:t>
             </a:fld>
             <a:endParaRPr lang="en-US"/>
           </a:p>
@@ -1331,7 +1331,7 @@
             <a:fld id="{1D8BD707-D9CF-40AE-B4C6-C98DA3205C09}" type="datetimeFigureOut">
               <a:rPr lang="en-US" smtClean="0"/>
               <a:pPr/>
-              <a:t>8/24/2010</a:t>
+              <a:t>8/25/2010</a:t>
             </a:fld>
             <a:endParaRPr lang="en-US"/>
           </a:p>
@@ -1750,7 +1750,7 @@
             <a:fld id="{1D8BD707-D9CF-40AE-B4C6-C98DA3205C09}" type="datetimeFigureOut">
               <a:rPr lang="en-US" smtClean="0"/>
               <a:pPr/>
-              <a:t>8/24/2010</a:t>
+              <a:t>8/25/2010</a:t>
             </a:fld>
             <a:endParaRPr lang="en-US"/>
           </a:p>
@@ -1865,7 +1865,7 @@
             <a:fld id="{1D8BD707-D9CF-40AE-B4C6-C98DA3205C09}" type="datetimeFigureOut">
               <a:rPr lang="en-US" smtClean="0"/>
               <a:pPr/>
-              <a:t>8/24/2010</a:t>
+              <a:t>8/25/2010</a:t>
             </a:fld>
             <a:endParaRPr lang="en-US"/>
           </a:p>
@@ -1957,7 +1957,7 @@
             <a:fld id="{1D8BD707-D9CF-40AE-B4C6-C98DA3205C09}" type="datetimeFigureOut">
               <a:rPr lang="en-US" smtClean="0"/>
               <a:pPr/>
-              <a:t>8/24/2010</a:t>
+              <a:t>8/25/2010</a:t>
             </a:fld>
             <a:endParaRPr lang="en-US"/>
           </a:p>
@@ -2231,7 +2231,7 @@
             <a:fld id="{1D8BD707-D9CF-40AE-B4C6-C98DA3205C09}" type="datetimeFigureOut">
               <a:rPr lang="en-US" smtClean="0"/>
               <a:pPr/>
-              <a:t>8/24/2010</a:t>
+              <a:t>8/25/2010</a:t>
             </a:fld>
             <a:endParaRPr lang="en-US"/>
           </a:p>
@@ -2481,7 +2481,7 @@
             <a:fld id="{1D8BD707-D9CF-40AE-B4C6-C98DA3205C09}" type="datetimeFigureOut">
               <a:rPr lang="en-US" smtClean="0"/>
               <a:pPr/>
-              <a:t>8/24/2010</a:t>
+              <a:t>8/25/2010</a:t>
             </a:fld>
             <a:endParaRPr lang="en-US"/>
           </a:p>
@@ -2691,7 +2691,7 @@
             <a:fld id="{1D8BD707-D9CF-40AE-B4C6-C98DA3205C09}" type="datetimeFigureOut">
               <a:rPr lang="en-US" smtClean="0"/>
               <a:pPr/>
-              <a:t>8/24/2010</a:t>
+              <a:t>8/25/2010</a:t>
             </a:fld>
             <a:endParaRPr lang="en-US"/>
           </a:p>
@@ -3159,12 +3159,12 @@
           <a:p>
             <a:pPr algn="ctr"/>
             <a:r>
-              <a:rPr lang="en-US" sz="1600" dirty="0" smtClean="0">
+              <a:rPr lang="en-US" sz="1600" smtClean="0">
                 <a:solidFill>
                   <a:schemeClr val="tx1"/>
                 </a:solidFill>
               </a:rPr>
-              <a:t>collections</a:t>
+              <a:t>Collections</a:t>
             </a:r>
             <a:endParaRPr lang="en-US" sz="1600" dirty="0">
               <a:solidFill>
@@ -4283,13 +4283,18 @@
           <a:p>
             <a:pPr algn="ctr"/>
             <a:r>
-              <a:rPr lang="en-US" sz="1600" dirty="0" smtClean="0">
+              <a:rPr lang="en-US" sz="1600" smtClean="0">
                 <a:solidFill>
                   <a:schemeClr val="tx1"/>
                 </a:solidFill>
               </a:rPr>
-              <a:t>Tile</a:t>
-            </a:r>
+              <a:t>Title</a:t>
+            </a:r>
+            <a:endParaRPr lang="en-US" sz="1600" dirty="0" smtClean="0">
+              <a:solidFill>
+                <a:schemeClr val="tx1"/>
+              </a:solidFill>
+            </a:endParaRPr>
           </a:p>
           <a:p>
             <a:pPr algn="ctr"/>
@@ -4673,11 +4678,7 @@
           <a:p>
             <a:r>
               <a:rPr lang="en-US" b="1" dirty="0" smtClean="0"/>
-              <a:t>(2) </a:t>
-            </a:r>
-            <a:r>
-              <a:rPr lang="en-US" b="1" dirty="0" smtClean="0"/>
-              <a:t>Module </a:t>
+              <a:t>(2) Module </a:t>
             </a:r>
             <a:r>
               <a:rPr lang="en-US" b="1" dirty="0" smtClean="0">

</xml_diff>